<commit_message>
Frontend test file for CORS.
</commit_message>
<xml_diff>
--- a/doc/System-Design.pptx
+++ b/doc/System-Design.pptx
@@ -4111,8 +4111,8 @@
         </p:nvSpPr>
         <p:spPr>
           <a:xfrm>
-            <a:off x="5701172" y="1684977"/>
-            <a:ext cx="5529080" cy="3139321"/>
+            <a:off x="5701171" y="1684977"/>
+            <a:ext cx="5877255" cy="2862322"/>
           </a:xfrm>
           <a:prstGeom prst="rect">
             <a:avLst/>
@@ -4268,19 +4268,7 @@
             </a:r>
             <a:r>
               <a:rPr lang="en-US" altLang="zh-CN" dirty="0"/>
-              <a:t>y’</a:t>
-            </a:r>
-            <a:r>
-              <a:rPr lang="zh-CN" altLang="en-US" dirty="0"/>
-              <a:t>，</a:t>
-            </a:r>
-            <a:endParaRPr lang="en-US" altLang="zh-CN" dirty="0"/>
-          </a:p>
-          <a:p>
-            <a:pPr lvl="1"/>
-            <a:r>
-              <a:rPr lang="en-US" altLang="zh-CN" dirty="0"/>
-              <a:t>       </a:t>
+              <a:t>y’, </a:t>
             </a:r>
             <a:r>
               <a:rPr lang="zh-CN" altLang="en-US" dirty="0"/>
@@ -4315,16 +4303,12 @@
               <a:t>aaaaa</a:t>
             </a:r>
             <a:r>
+              <a:rPr lang="en-US" altLang="zh-CN" dirty="0"/>
+              <a:t>,</a:t>
+            </a:r>
+            <a:r>
               <a:rPr lang="zh-CN" altLang="en-US" dirty="0"/>
-              <a:t>，</a:t>
-            </a:r>
-            <a:endParaRPr lang="en-US" altLang="zh-CN" dirty="0"/>
-          </a:p>
-          <a:p>
-            <a:pPr lvl="1"/>
-            <a:r>
-              <a:rPr lang="en-US" dirty="0"/>
-              <a:t>        </a:t>
+              <a:t> </a:t>
             </a:r>
             <a:r>
               <a:rPr lang="en-US" altLang="zh-CN" dirty="0"/>

</xml_diff>